<commit_message>
update to while loop slides
</commit_message>
<xml_diff>
--- a/Python Day 4 While Loops.pptx
+++ b/Python Day 4 While Loops.pptx
@@ -225,7 +225,7 @@
           <a:p>
             <a:fld id="{6E488D89-E43B-4E30-86EA-3A041CF79CE3}" type="datetimeFigureOut">
               <a:rPr lang="en-US" smtClean="0"/>
-              <a:t>2/13/2018</a:t>
+              <a:t>2/16/2018</a:t>
             </a:fld>
             <a:endParaRPr lang="en-US"/>
           </a:p>
@@ -1003,7 +1003,7 @@
           <a:p>
             <a:fld id="{1160EA64-D806-43AC-9DF2-F8C432F32B4C}" type="datetimeFigureOut">
               <a:rPr lang="en-US" dirty="0"/>
-              <a:t>2/13/2018</a:t>
+              <a:t>2/16/2018</a:t>
             </a:fld>
             <a:endParaRPr lang="en-US" dirty="0"/>
           </a:p>
@@ -1169,7 +1169,7 @@
           <a:p>
             <a:fld id="{E9F9C37B-1D36-470B-8223-D6C91242EC14}" type="datetimeFigureOut">
               <a:rPr lang="en-US" dirty="0"/>
-              <a:t>2/13/2018</a:t>
+              <a:t>2/16/2018</a:t>
             </a:fld>
             <a:endParaRPr lang="en-US" dirty="0"/>
           </a:p>
@@ -1344,7 +1344,7 @@
           <a:p>
             <a:fld id="{67C6F52A-A82B-47A2-A83A-8C4C91F2D59F}" type="datetimeFigureOut">
               <a:rPr lang="en-US" dirty="0"/>
-              <a:t>2/13/2018</a:t>
+              <a:t>2/16/2018</a:t>
             </a:fld>
             <a:endParaRPr lang="en-US" dirty="0"/>
           </a:p>
@@ -1509,7 +1509,7 @@
           <a:p>
             <a:fld id="{F070A7B3-6521-4DCA-87E5-044747A908C1}" type="datetimeFigureOut">
               <a:rPr lang="en-US" dirty="0"/>
-              <a:t>2/13/2018</a:t>
+              <a:t>2/16/2018</a:t>
             </a:fld>
             <a:endParaRPr lang="en-US" dirty="0"/>
           </a:p>
@@ -1773,7 +1773,7 @@
           <a:p>
             <a:fld id="{1160EA64-D806-43AC-9DF2-F8C432F32B4C}" type="datetimeFigureOut">
               <a:rPr lang="en-US" dirty="0"/>
-              <a:t>2/13/2018</a:t>
+              <a:t>2/16/2018</a:t>
             </a:fld>
             <a:endParaRPr lang="en-US" dirty="0"/>
           </a:p>
@@ -2001,7 +2001,7 @@
           <a:p>
             <a:fld id="{AB134690-1557-4C89-A502-4959FE7FAD70}" type="datetimeFigureOut">
               <a:rPr lang="en-US" dirty="0"/>
-              <a:t>2/13/2018</a:t>
+              <a:t>2/16/2018</a:t>
             </a:fld>
             <a:endParaRPr lang="en-US" dirty="0"/>
           </a:p>
@@ -2355,7 +2355,7 @@
           <a:p>
             <a:fld id="{4F7D4976-E339-4826-83B7-FBD03F55ECF8}" type="datetimeFigureOut">
               <a:rPr lang="en-US" dirty="0"/>
-              <a:t>2/13/2018</a:t>
+              <a:t>2/16/2018</a:t>
             </a:fld>
             <a:endParaRPr lang="en-US" dirty="0"/>
           </a:p>
@@ -2491,7 +2491,7 @@
           <a:p>
             <a:fld id="{E1037C31-9E7A-4F99-8774-A0E530DE1A42}" type="datetimeFigureOut">
               <a:rPr lang="en-US" dirty="0"/>
-              <a:t>2/13/2018</a:t>
+              <a:t>2/16/2018</a:t>
             </a:fld>
             <a:endParaRPr lang="en-US" dirty="0"/>
           </a:p>
@@ -2581,7 +2581,7 @@
           <a:p>
             <a:fld id="{C278504F-A551-4DE0-9316-4DCD1D8CC752}" type="datetimeFigureOut">
               <a:rPr lang="en-US" dirty="0"/>
-              <a:t>2/13/2018</a:t>
+              <a:t>2/16/2018</a:t>
             </a:fld>
             <a:endParaRPr lang="en-US" dirty="0"/>
           </a:p>
@@ -2933,7 +2933,7 @@
           <a:p>
             <a:fld id="{D1BE4249-C0D0-4B06-8692-E8BB871AF643}" type="datetimeFigureOut">
               <a:rPr lang="en-US" dirty="0"/>
-              <a:t>2/13/2018</a:t>
+              <a:t>2/16/2018</a:t>
             </a:fld>
             <a:endParaRPr lang="en-US" dirty="0"/>
           </a:p>
@@ -3285,7 +3285,7 @@
           <a:p>
             <a:fld id="{042B0DB6-F5C7-45FB-8CF3-31B45F9C2DAC}" type="datetimeFigureOut">
               <a:rPr lang="en-US" dirty="0"/>
-              <a:t>2/13/2018</a:t>
+              <a:t>2/16/2018</a:t>
             </a:fld>
             <a:endParaRPr lang="en-US" dirty="0"/>
           </a:p>
@@ -3521,7 +3521,7 @@
           <a:p>
             <a:fld id="{1160EA64-D806-43AC-9DF2-F8C432F32B4C}" type="datetimeFigureOut">
               <a:rPr lang="en-US" dirty="0"/>
-              <a:t>2/13/2018</a:t>
+              <a:t>2/16/2018</a:t>
             </a:fld>
             <a:endParaRPr lang="en-US" dirty="0"/>
           </a:p>
@@ -8960,7 +8960,7 @@
                   </a:schemeClr>
                 </a:solidFill>
               </a:rPr>
-              <a:t>Note the Boolean condition and the incrementation of the variable. Those are key elements of a While Loop.</a:t>
+              <a:t>Note the Boolean condition and the incrementation of the variable. Those are key elements of a while loop.</a:t>
             </a:r>
           </a:p>
           <a:p>

</xml_diff>